<commit_message>
fixed the URL for the fake news data set.
</commit_message>
<xml_diff>
--- a/19-NLP-2.pptx
+++ b/19-NLP-2.pptx
@@ -8901,7 +8901,7 @@
         </p:spPr>
         <p:txBody>
           <a:bodyPr spcFirstLastPara="1" wrap="square" lIns="91425" tIns="91425" rIns="91425" bIns="91425" anchor="t" anchorCtr="0">
-            <a:noAutofit/>
+            <a:normAutofit fontScale="85000" lnSpcReduction="20000"/>
           </a:bodyPr>
           <a:lstStyle/>
           <a:p>
@@ -8932,23 +8932,42 @@
             </a:pPr>
             <a:r>
               <a:rPr lang="en" sz="1400" dirty="0"/>
-              <a:t>A training set for this is available here:</a:t>
-            </a:r>
-            <a:br>
-              <a:rPr lang="en" sz="1400" dirty="0"/>
-            </a:br>
-            <a:r>
-              <a:rPr lang="en" sz="1400" dirty="0"/>
-              <a:t>  </a:t>
-            </a:r>
-            <a:r>
-              <a:rPr lang="en" sz="1400" u="sng" dirty="0">
-                <a:solidFill>
-                  <a:schemeClr val="hlink"/>
-                </a:solidFill>
+              <a:t>A training set for this is available here</a:t>
+            </a:r>
+            <a:r>
+              <a:rPr lang="en" sz="1400" dirty="0" smtClean="0"/>
+              <a:t>:</a:t>
+            </a:r>
+            <a:endParaRPr lang="en-US" sz="1400" u="sng" dirty="0" smtClean="0">
+              <a:solidFill>
+                <a:schemeClr val="hlink"/>
+              </a:solidFill>
+            </a:endParaRPr>
+          </a:p>
+          <a:p>
+            <a:pPr marL="0" lvl="0" indent="0">
+              <a:spcBef>
+                <a:spcPts val="1600"/>
+              </a:spcBef>
+              <a:buNone/>
+            </a:pPr>
+            <a:r>
+              <a:rPr lang="en-US" sz="1400" dirty="0">
                 <a:hlinkClick r:id="rId3"/>
               </a:rPr>
-              <a:t>https://github.com/GeorgeMcIntire/fake_real_news_dataset/blob/master/fake_or_real_news.csv.zip</a:t>
+              <a:t>https://</a:t>
+            </a:r>
+            <a:r>
+              <a:rPr lang="en-US" sz="1400" dirty="0" smtClean="0">
+                <a:hlinkClick r:id="rId3"/>
+              </a:rPr>
+              <a:t>raw.githubusercontent.com/lutzhamel/fake-news/master/data/</a:t>
+            </a:r>
+            <a:r>
+              <a:rPr lang="en-US" sz="1400" smtClean="0">
+                <a:hlinkClick r:id="rId3"/>
+              </a:rPr>
+              <a:t>fake_or_real_news.csv</a:t>
             </a:r>
             <a:endParaRPr sz="1400" dirty="0"/>
           </a:p>
@@ -8964,7 +8983,15 @@
             </a:pPr>
             <a:r>
               <a:rPr lang="en" sz="1400" dirty="0"/>
-              <a:t>The fields you are interested in are ‘text’ and ‘label’ with the obvious interpretations</a:t>
+              <a:t>The fields you are interested in are ‘text’ and ‘label’ with the obvious </a:t>
+            </a:r>
+            <a:r>
+              <a:rPr lang="en" sz="1400" dirty="0" smtClean="0"/>
+              <a:t>interpretations</a:t>
+            </a:r>
+            <a:r>
+              <a:rPr lang="en-US" sz="1400" dirty="0" smtClean="0"/>
+              <a:t>. </a:t>
             </a:r>
             <a:endParaRPr sz="1400" dirty="0"/>
           </a:p>
@@ -9028,7 +9055,31 @@
             </a:pPr>
             <a:r>
               <a:rPr lang="en" sz="1400" dirty="0"/>
-              <a:t>The data set contain 11,000 articles (takes a long time to train), you can </a:t>
+              <a:t>The data set </a:t>
+            </a:r>
+            <a:r>
+              <a:rPr lang="en" sz="1400" dirty="0" smtClean="0"/>
+              <a:t>contain</a:t>
+            </a:r>
+            <a:r>
+              <a:rPr lang="en-US" sz="1400" dirty="0" smtClean="0"/>
+              <a:t>s</a:t>
+            </a:r>
+            <a:r>
+              <a:rPr lang="en" sz="1400" dirty="0" smtClean="0"/>
+              <a:t> </a:t>
+            </a:r>
+            <a:r>
+              <a:rPr lang="en-US" sz="1400" dirty="0" smtClean="0"/>
+              <a:t>a large number of</a:t>
+            </a:r>
+            <a:r>
+              <a:rPr lang="en" sz="1400" dirty="0" smtClean="0"/>
+              <a:t> </a:t>
+            </a:r>
+            <a:r>
+              <a:rPr lang="en" sz="1400" dirty="0"/>
+              <a:t>articles (takes a long time to train), you can </a:t>
             </a:r>
             <a:r>
               <a:rPr lang="en" sz="1400" dirty="0" err="1"/>
@@ -9044,15 +9095,42 @@
             </a:r>
             <a:r>
               <a:rPr lang="en" sz="1400" dirty="0"/>
-              <a:t> documentation for </a:t>
-            </a:r>
-            <a:r>
-              <a:rPr lang="en" sz="1400"/>
-              <a:t>sampling</a:t>
-            </a:r>
-            <a:r>
-              <a:rPr lang="en" sz="1400" smtClean="0"/>
+              <a:t> documentation for sampling</a:t>
+            </a:r>
+            <a:r>
+              <a:rPr lang="en" sz="1400" dirty="0" smtClean="0"/>
               <a:t>)</a:t>
+            </a:r>
+            <a:endParaRPr lang="en-US" sz="1400" dirty="0" smtClean="0"/>
+          </a:p>
+          <a:p>
+            <a:pPr marL="0" lvl="0" indent="0">
+              <a:spcBef>
+                <a:spcPts val="1600"/>
+              </a:spcBef>
+              <a:spcAft>
+                <a:spcPts val="0"/>
+              </a:spcAft>
+              <a:buNone/>
+            </a:pPr>
+            <a:r>
+              <a:rPr lang="en-US" sz="1400" dirty="0" smtClean="0"/>
+              <a:t>You are free to pick your own team (max three members)</a:t>
+            </a:r>
+          </a:p>
+          <a:p>
+            <a:pPr marL="0" lvl="0" indent="0">
+              <a:spcBef>
+                <a:spcPts val="1600"/>
+              </a:spcBef>
+              <a:spcAft>
+                <a:spcPts val="0"/>
+              </a:spcAft>
+              <a:buNone/>
+            </a:pPr>
+            <a:r>
+              <a:rPr lang="en-US" sz="1400" dirty="0" smtClean="0"/>
+              <a:t>Extra Credit:  Try the same thing but instead of ‘text’ use ‘title’ for your training text.  How does a classifier built on this data set compare to the original classifier.</a:t>
             </a:r>
             <a:endParaRPr sz="1400" dirty="0"/>
           </a:p>

</xml_diff>